<commit_message>
add control to sequence logo
</commit_message>
<xml_diff>
--- a/MOTIF/SeqLogo/seqlogo collate.pptx
+++ b/MOTIF/SeqLogo/seqlogo collate.pptx
@@ -10,6 +10,7 @@
     <p:sldId id="258" r:id="rId4"/>
     <p:sldId id="259" r:id="rId5"/>
     <p:sldId id="260" r:id="rId6"/>
+    <p:sldId id="262" r:id="rId7"/>
   </p:sldIdLst>
   <p:sldSz cx="12192000" cy="6858000"/>
   <p:notesSz cx="6858000" cy="9144000"/>
@@ -108,6 +109,11 @@
       </a:defRPr>
     </a:lvl9pPr>
   </p:defaultTextStyle>
+  <p:extLst>
+    <p:ext uri="{EFAFB233-063F-42B5-8137-9DF3F51BA10A}">
+      <p15:sldGuideLst xmlns:p15="http://schemas.microsoft.com/office/powerpoint/2012/main"/>
+    </p:ext>
+  </p:extLst>
 </p:presentation>
 </file>
 
@@ -3421,14 +3427,21 @@
             <p:ph type="title"/>
           </p:nvPr>
         </p:nvSpPr>
-        <p:spPr/>
-        <p:txBody>
-          <a:bodyPr/>
+        <p:spPr>
+          <a:xfrm>
+            <a:off x="838200" y="365125"/>
+            <a:ext cx="10515600" cy="1325563"/>
+          </a:xfrm>
+        </p:spPr>
+        <p:txBody>
+          <a:bodyPr>
+            <a:normAutofit/>
+          </a:bodyPr>
           <a:lstStyle/>
           <a:p>
             <a:r>
               <a:rPr lang="en-US" dirty="0"/>
-              <a:t>RPF t0</a:t>
+              <a:t>RPF t0 </a:t>
             </a:r>
           </a:p>
         </p:txBody>
@@ -3653,6 +3666,47 @@
             <a:r>
               <a:rPr lang="en-US" dirty="0"/>
               <a:t>higher</a:t>
+            </a:r>
+          </a:p>
+        </p:txBody>
+      </p:sp>
+      <p:sp>
+        <p:nvSpPr>
+          <p:cNvPr id="3" name="TextBox 2">
+            <a:extLst>
+              <a:ext uri="{FF2B5EF4-FFF2-40B4-BE49-F238E27FC236}">
+                <a16:creationId xmlns:a16="http://schemas.microsoft.com/office/drawing/2014/main" id="{DA256051-B275-E343-A3CB-0C8776E35CE1}"/>
+              </a:ext>
+            </a:extLst>
+          </p:cNvPr>
+          <p:cNvSpPr txBox="1"/>
+          <p:nvPr/>
+        </p:nvSpPr>
+        <p:spPr>
+          <a:xfrm>
+            <a:off x="838200" y="3013894"/>
+            <a:ext cx="2192588" cy="646331"/>
+          </a:xfrm>
+          <a:prstGeom prst="rect">
+            <a:avLst/>
+          </a:prstGeom>
+          <a:noFill/>
+        </p:spPr>
+        <p:txBody>
+          <a:bodyPr wrap="none" rtlCol="0">
+            <a:spAutoFit/>
+          </a:bodyPr>
+          <a:lstStyle/>
+          <a:p>
+            <a:r>
+              <a:rPr lang="en-US" dirty="0"/>
+              <a:t>Pass read count filter,</a:t>
+            </a:r>
+          </a:p>
+          <a:p>
+            <a:r>
+              <a:rPr lang="en-US" dirty="0"/>
+              <a:t>1598 genes in each</a:t>
             </a:r>
           </a:p>
         </p:txBody>
@@ -3939,6 +3993,47 @@
           </a:prstGeom>
         </p:spPr>
       </p:pic>
+      <p:sp>
+        <p:nvSpPr>
+          <p:cNvPr id="10" name="TextBox 9">
+            <a:extLst>
+              <a:ext uri="{FF2B5EF4-FFF2-40B4-BE49-F238E27FC236}">
+                <a16:creationId xmlns:a16="http://schemas.microsoft.com/office/drawing/2014/main" id="{288BA5EA-65D6-8148-A844-8506ACFC0BBD}"/>
+              </a:ext>
+            </a:extLst>
+          </p:cNvPr>
+          <p:cNvSpPr txBox="1"/>
+          <p:nvPr/>
+        </p:nvSpPr>
+        <p:spPr>
+          <a:xfrm>
+            <a:off x="838200" y="3013894"/>
+            <a:ext cx="2192588" cy="646331"/>
+          </a:xfrm>
+          <a:prstGeom prst="rect">
+            <a:avLst/>
+          </a:prstGeom>
+          <a:noFill/>
+        </p:spPr>
+        <p:txBody>
+          <a:bodyPr wrap="none" rtlCol="0">
+            <a:spAutoFit/>
+          </a:bodyPr>
+          <a:lstStyle/>
+          <a:p>
+            <a:r>
+              <a:rPr lang="en-US" dirty="0"/>
+              <a:t>Pass read count filter,</a:t>
+            </a:r>
+          </a:p>
+          <a:p>
+            <a:r>
+              <a:rPr lang="en-US" dirty="0"/>
+              <a:t>1598 genes in each</a:t>
+            </a:r>
+          </a:p>
+        </p:txBody>
+      </p:sp>
     </p:spTree>
     <p:extLst>
       <p:ext uri="{BB962C8B-B14F-4D97-AF65-F5344CB8AC3E}">
@@ -4221,6 +4316,47 @@
           </a:prstGeom>
         </p:spPr>
       </p:pic>
+      <p:sp>
+        <p:nvSpPr>
+          <p:cNvPr id="10" name="TextBox 9">
+            <a:extLst>
+              <a:ext uri="{FF2B5EF4-FFF2-40B4-BE49-F238E27FC236}">
+                <a16:creationId xmlns:a16="http://schemas.microsoft.com/office/drawing/2014/main" id="{40850138-D2E5-204C-BB32-C2E3454553B9}"/>
+              </a:ext>
+            </a:extLst>
+          </p:cNvPr>
+          <p:cNvSpPr txBox="1"/>
+          <p:nvPr/>
+        </p:nvSpPr>
+        <p:spPr>
+          <a:xfrm>
+            <a:off x="838200" y="3013894"/>
+            <a:ext cx="2192588" cy="646331"/>
+          </a:xfrm>
+          <a:prstGeom prst="rect">
+            <a:avLst/>
+          </a:prstGeom>
+          <a:noFill/>
+        </p:spPr>
+        <p:txBody>
+          <a:bodyPr wrap="none" rtlCol="0">
+            <a:spAutoFit/>
+          </a:bodyPr>
+          <a:lstStyle/>
+          <a:p>
+            <a:r>
+              <a:rPr lang="en-US" dirty="0"/>
+              <a:t>Pass read count filter,</a:t>
+            </a:r>
+          </a:p>
+          <a:p>
+            <a:r>
+              <a:rPr lang="en-US" dirty="0"/>
+              <a:t>1598 genes in each</a:t>
+            </a:r>
+          </a:p>
+        </p:txBody>
+      </p:sp>
     </p:spTree>
     <p:extLst>
       <p:ext uri="{BB962C8B-B14F-4D97-AF65-F5344CB8AC3E}">
@@ -4275,7 +4411,7 @@
         </p:blipFill>
         <p:spPr>
           <a:xfrm>
-            <a:off x="0" y="0"/>
+            <a:off x="102740" y="246578"/>
             <a:ext cx="5876818" cy="1624767"/>
           </a:xfrm>
         </p:spPr>
@@ -4294,8 +4430,8 @@
         </p:nvSpPr>
         <p:spPr>
           <a:xfrm>
-            <a:off x="1695236" y="1624767"/>
-            <a:ext cx="1687963" cy="369332"/>
+            <a:off x="1970925" y="1871345"/>
+            <a:ext cx="2568011" cy="369332"/>
           </a:xfrm>
           <a:prstGeom prst="rect">
             <a:avLst/>
@@ -4310,17 +4446,17 @@
           <a:p>
             <a:r>
               <a:rPr lang="en-US" dirty="0"/>
-              <a:t>L24 T1 40 genes</a:t>
+              <a:t>L24 T1 enriched 40 genes</a:t>
             </a:r>
           </a:p>
         </p:txBody>
       </p:sp>
       <p:pic>
         <p:nvPicPr>
-          <p:cNvPr id="8" name="Picture 7">
-            <a:extLst>
-              <a:ext uri="{FF2B5EF4-FFF2-40B4-BE49-F238E27FC236}">
-                <a16:creationId xmlns:a16="http://schemas.microsoft.com/office/drawing/2014/main" id="{93B1ACEE-8198-5E4A-B711-BCB680F2E51C}"/>
+          <p:cNvPr id="3" name="Picture 2">
+            <a:extLst>
+              <a:ext uri="{FF2B5EF4-FFF2-40B4-BE49-F238E27FC236}">
+                <a16:creationId xmlns:a16="http://schemas.microsoft.com/office/drawing/2014/main" id="{8C95C264-9CCC-5B4A-8120-33E2B16A3B36}"/>
               </a:ext>
             </a:extLst>
           </p:cNvPr>
@@ -4337,8 +4473,8 @@
         </p:blipFill>
         <p:spPr>
           <a:xfrm>
-            <a:off x="6390526" y="121206"/>
-            <a:ext cx="5801474" cy="1603937"/>
+            <a:off x="102740" y="2600762"/>
+            <a:ext cx="5876818" cy="1624767"/>
           </a:xfrm>
           <a:prstGeom prst="rect">
             <a:avLst/>
@@ -4347,10 +4483,10 @@
       </p:pic>
       <p:sp>
         <p:nvSpPr>
-          <p:cNvPr id="9" name="TextBox 8">
-            <a:extLst>
-              <a:ext uri="{FF2B5EF4-FFF2-40B4-BE49-F238E27FC236}">
-                <a16:creationId xmlns:a16="http://schemas.microsoft.com/office/drawing/2014/main" id="{CF1F5E01-95C6-4346-B9D7-D3262292DEC5}"/>
+          <p:cNvPr id="12" name="TextBox 11">
+            <a:extLst>
+              <a:ext uri="{FF2B5EF4-FFF2-40B4-BE49-F238E27FC236}">
+                <a16:creationId xmlns:a16="http://schemas.microsoft.com/office/drawing/2014/main" id="{F53A923D-AD7C-CD4E-9336-4C3B29637D0C}"/>
               </a:ext>
             </a:extLst>
           </p:cNvPr>
@@ -4359,8 +4495,8 @@
         </p:nvSpPr>
         <p:spPr>
           <a:xfrm>
-            <a:off x="8310081" y="1725143"/>
-            <a:ext cx="1812997" cy="369332"/>
+            <a:off x="1970925" y="4585614"/>
+            <a:ext cx="2578719" cy="369332"/>
           </a:xfrm>
           <a:prstGeom prst="rect">
             <a:avLst/>
@@ -4375,17 +4511,212 @@
           <a:p>
             <a:r>
               <a:rPr lang="en-US" dirty="0"/>
-              <a:t>S15 T0 110 genes</a:t>
-            </a:r>
-          </a:p>
-        </p:txBody>
-      </p:sp>
+              <a:t>L24 T1 depleted 40 genes</a:t>
+            </a:r>
+          </a:p>
+        </p:txBody>
+      </p:sp>
+    </p:spTree>
+    <p:extLst>
+      <p:ext uri="{BB962C8B-B14F-4D97-AF65-F5344CB8AC3E}">
+        <p14:creationId xmlns:p14="http://schemas.microsoft.com/office/powerpoint/2010/main" val="3120621623"/>
+      </p:ext>
+    </p:extLst>
+  </p:cSld>
+  <p:clrMapOvr>
+    <a:masterClrMapping/>
+  </p:clrMapOvr>
+</p:sld>
+</file>
+
+<file path=ppt/slides/slide6.xml><?xml version="1.0" encoding="utf-8"?>
+<p:sld xmlns:a="http://schemas.openxmlformats.org/drawingml/2006/main" xmlns:r="http://schemas.openxmlformats.org/officeDocument/2006/relationships" xmlns:p="http://schemas.openxmlformats.org/presentationml/2006/main">
+  <p:cSld>
+    <p:spTree>
+      <p:nvGrpSpPr>
+        <p:cNvPr id="1" name=""/>
+        <p:cNvGrpSpPr/>
+        <p:nvPr/>
+      </p:nvGrpSpPr>
+      <p:grpSpPr>
+        <a:xfrm>
+          <a:off x="0" y="0"/>
+          <a:ext cx="0" cy="0"/>
+          <a:chOff x="0" y="0"/>
+          <a:chExt cx="0" cy="0"/>
+        </a:xfrm>
+      </p:grpSpPr>
       <p:pic>
         <p:nvPicPr>
-          <p:cNvPr id="13" name="Picture 12">
-            <a:extLst>
-              <a:ext uri="{FF2B5EF4-FFF2-40B4-BE49-F238E27FC236}">
-                <a16:creationId xmlns:a16="http://schemas.microsoft.com/office/drawing/2014/main" id="{000ECFB3-CEAC-6843-ADA1-50E8E432F439}"/>
+          <p:cNvPr id="4" name="Picture 3">
+            <a:extLst>
+              <a:ext uri="{FF2B5EF4-FFF2-40B4-BE49-F238E27FC236}">
+                <a16:creationId xmlns:a16="http://schemas.microsoft.com/office/drawing/2014/main" id="{059098D1-B78D-2145-BD9C-113C676AE23D}"/>
+              </a:ext>
+            </a:extLst>
+          </p:cNvPr>
+          <p:cNvPicPr>
+            <a:picLocks noChangeAspect="1"/>
+          </p:cNvPicPr>
+          <p:nvPr/>
+        </p:nvPicPr>
+        <p:blipFill>
+          <a:blip r:embed="rId2"/>
+          <a:stretch>
+            <a:fillRect/>
+          </a:stretch>
+        </p:blipFill>
+        <p:spPr>
+          <a:xfrm>
+            <a:off x="6390525" y="355998"/>
+            <a:ext cx="5801475" cy="1603937"/>
+          </a:xfrm>
+          <a:prstGeom prst="rect">
+            <a:avLst/>
+          </a:prstGeom>
+        </p:spPr>
+      </p:pic>
+      <p:sp>
+        <p:nvSpPr>
+          <p:cNvPr id="5" name="TextBox 4">
+            <a:extLst>
+              <a:ext uri="{FF2B5EF4-FFF2-40B4-BE49-F238E27FC236}">
+                <a16:creationId xmlns:a16="http://schemas.microsoft.com/office/drawing/2014/main" id="{E1D5259C-5478-ED41-BC64-2C4FAC2DDE81}"/>
+              </a:ext>
+            </a:extLst>
+          </p:cNvPr>
+          <p:cNvSpPr txBox="1"/>
+          <p:nvPr/>
+        </p:nvSpPr>
+        <p:spPr>
+          <a:xfrm>
+            <a:off x="7781706" y="1959935"/>
+            <a:ext cx="2703753" cy="369332"/>
+          </a:xfrm>
+          <a:prstGeom prst="rect">
+            <a:avLst/>
+          </a:prstGeom>
+          <a:noFill/>
+        </p:spPr>
+        <p:txBody>
+          <a:bodyPr wrap="none" rtlCol="0">
+            <a:spAutoFit/>
+          </a:bodyPr>
+          <a:lstStyle/>
+          <a:p>
+            <a:r>
+              <a:rPr lang="en-US" dirty="0"/>
+              <a:t>S15 T0 depleted 110 genes</a:t>
+            </a:r>
+          </a:p>
+        </p:txBody>
+      </p:sp>
+      <p:sp>
+        <p:nvSpPr>
+          <p:cNvPr id="6" name="TextBox 5">
+            <a:extLst>
+              <a:ext uri="{FF2B5EF4-FFF2-40B4-BE49-F238E27FC236}">
+                <a16:creationId xmlns:a16="http://schemas.microsoft.com/office/drawing/2014/main" id="{AB734A63-2905-F94C-BDE7-47FFC1AB54BD}"/>
+              </a:ext>
+            </a:extLst>
+          </p:cNvPr>
+          <p:cNvSpPr txBox="1"/>
+          <p:nvPr/>
+        </p:nvSpPr>
+        <p:spPr>
+          <a:xfrm>
+            <a:off x="7781706" y="4046505"/>
+            <a:ext cx="2703753" cy="369332"/>
+          </a:xfrm>
+          <a:prstGeom prst="rect">
+            <a:avLst/>
+          </a:prstGeom>
+          <a:noFill/>
+        </p:spPr>
+        <p:txBody>
+          <a:bodyPr wrap="none" rtlCol="0">
+            <a:spAutoFit/>
+          </a:bodyPr>
+          <a:lstStyle/>
+          <a:p>
+            <a:r>
+              <a:rPr lang="en-US" dirty="0"/>
+              <a:t>S15 T1 depleted 189 genes</a:t>
+            </a:r>
+          </a:p>
+        </p:txBody>
+      </p:sp>
+      <p:pic>
+        <p:nvPicPr>
+          <p:cNvPr id="7" name="Picture 6">
+            <a:extLst>
+              <a:ext uri="{FF2B5EF4-FFF2-40B4-BE49-F238E27FC236}">
+                <a16:creationId xmlns:a16="http://schemas.microsoft.com/office/drawing/2014/main" id="{8C7B9097-A530-A041-96D6-17260ED6C473}"/>
+              </a:ext>
+            </a:extLst>
+          </p:cNvPr>
+          <p:cNvPicPr>
+            <a:picLocks noChangeAspect="1"/>
+          </p:cNvPicPr>
+          <p:nvPr/>
+        </p:nvPicPr>
+        <p:blipFill>
+          <a:blip r:embed="rId3"/>
+          <a:stretch>
+            <a:fillRect/>
+          </a:stretch>
+        </p:blipFill>
+        <p:spPr>
+          <a:xfrm>
+            <a:off x="6390525" y="4650284"/>
+            <a:ext cx="5801475" cy="1603937"/>
+          </a:xfrm>
+          <a:prstGeom prst="rect">
+            <a:avLst/>
+          </a:prstGeom>
+        </p:spPr>
+      </p:pic>
+      <p:sp>
+        <p:nvSpPr>
+          <p:cNvPr id="8" name="TextBox 7">
+            <a:extLst>
+              <a:ext uri="{FF2B5EF4-FFF2-40B4-BE49-F238E27FC236}">
+                <a16:creationId xmlns:a16="http://schemas.microsoft.com/office/drawing/2014/main" id="{EEB61FA8-7A5F-6144-9AED-7013C77CB221}"/>
+              </a:ext>
+            </a:extLst>
+          </p:cNvPr>
+          <p:cNvSpPr txBox="1"/>
+          <p:nvPr/>
+        </p:nvSpPr>
+        <p:spPr>
+          <a:xfrm>
+            <a:off x="7781706" y="6488668"/>
+            <a:ext cx="2586734" cy="369332"/>
+          </a:xfrm>
+          <a:prstGeom prst="rect">
+            <a:avLst/>
+          </a:prstGeom>
+          <a:noFill/>
+        </p:spPr>
+        <p:txBody>
+          <a:bodyPr wrap="none" rtlCol="0">
+            <a:spAutoFit/>
+          </a:bodyPr>
+          <a:lstStyle/>
+          <a:p>
+            <a:r>
+              <a:rPr lang="en-US" dirty="0"/>
+              <a:t>S15 T2 depleted 33 genes</a:t>
+            </a:r>
+          </a:p>
+        </p:txBody>
+      </p:sp>
+      <p:pic>
+        <p:nvPicPr>
+          <p:cNvPr id="9" name="Picture 8">
+            <a:extLst>
+              <a:ext uri="{FF2B5EF4-FFF2-40B4-BE49-F238E27FC236}">
+                <a16:creationId xmlns:a16="http://schemas.microsoft.com/office/drawing/2014/main" id="{1E49D6B3-6884-454D-975B-224A20668256}"/>
               </a:ext>
             </a:extLst>
           </p:cNvPr>
@@ -4402,8 +4733,8 @@
         </p:blipFill>
         <p:spPr>
           <a:xfrm>
-            <a:off x="6393559" y="4429481"/>
-            <a:ext cx="5829642" cy="1611724"/>
+            <a:off x="6390525" y="2391947"/>
+            <a:ext cx="5801475" cy="1603937"/>
           </a:xfrm>
           <a:prstGeom prst="rect">
             <a:avLst/>
@@ -4412,10 +4743,10 @@
       </p:pic>
       <p:pic>
         <p:nvPicPr>
-          <p:cNvPr id="15" name="Picture 14">
-            <a:extLst>
-              <a:ext uri="{FF2B5EF4-FFF2-40B4-BE49-F238E27FC236}">
-                <a16:creationId xmlns:a16="http://schemas.microsoft.com/office/drawing/2014/main" id="{CD8970AD-1E31-E24C-945D-013A60A1381C}"/>
+          <p:cNvPr id="10" name="Picture 9">
+            <a:extLst>
+              <a:ext uri="{FF2B5EF4-FFF2-40B4-BE49-F238E27FC236}">
+                <a16:creationId xmlns:a16="http://schemas.microsoft.com/office/drawing/2014/main" id="{138EBEE0-25E0-D947-B839-12AC6510FE5B}"/>
               </a:ext>
             </a:extLst>
           </p:cNvPr>
@@ -4432,8 +4763,8 @@
         </p:blipFill>
         <p:spPr>
           <a:xfrm>
-            <a:off x="6390526" y="2194851"/>
-            <a:ext cx="5848221" cy="1616861"/>
+            <a:off x="0" y="355998"/>
+            <a:ext cx="5801474" cy="1603937"/>
           </a:xfrm>
           <a:prstGeom prst="rect">
             <a:avLst/>
@@ -4442,10 +4773,10 @@
       </p:pic>
       <p:sp>
         <p:nvSpPr>
-          <p:cNvPr id="16" name="TextBox 15">
-            <a:extLst>
-              <a:ext uri="{FF2B5EF4-FFF2-40B4-BE49-F238E27FC236}">
-                <a16:creationId xmlns:a16="http://schemas.microsoft.com/office/drawing/2014/main" id="{41590CC7-04FF-7042-8FAB-E3D4F00A0CB0}"/>
+          <p:cNvPr id="11" name="TextBox 10">
+            <a:extLst>
+              <a:ext uri="{FF2B5EF4-FFF2-40B4-BE49-F238E27FC236}">
+                <a16:creationId xmlns:a16="http://schemas.microsoft.com/office/drawing/2014/main" id="{7F526B56-4047-C44E-8AA8-0CFA0A275D89}"/>
               </a:ext>
             </a:extLst>
           </p:cNvPr>
@@ -4454,8 +4785,8 @@
         </p:nvSpPr>
         <p:spPr>
           <a:xfrm>
-            <a:off x="8310081" y="4012464"/>
-            <a:ext cx="1812997" cy="369332"/>
+            <a:off x="1919555" y="1959935"/>
+            <a:ext cx="2693045" cy="369332"/>
           </a:xfrm>
           <a:prstGeom prst="rect">
             <a:avLst/>
@@ -4470,17 +4801,77 @@
           <a:p>
             <a:r>
               <a:rPr lang="en-US" dirty="0"/>
-              <a:t>S15 T1 189 genes</a:t>
-            </a:r>
-          </a:p>
-        </p:txBody>
-      </p:sp>
-      <p:sp>
-        <p:nvSpPr>
-          <p:cNvPr id="17" name="TextBox 16">
-            <a:extLst>
-              <a:ext uri="{FF2B5EF4-FFF2-40B4-BE49-F238E27FC236}">
-                <a16:creationId xmlns:a16="http://schemas.microsoft.com/office/drawing/2014/main" id="{4FF38163-C445-A44D-BAD5-39D473595F2E}"/>
+              <a:t>S15 T0 enriched 110 genes</a:t>
+            </a:r>
+          </a:p>
+        </p:txBody>
+      </p:sp>
+      <p:pic>
+        <p:nvPicPr>
+          <p:cNvPr id="12" name="Picture 11">
+            <a:extLst>
+              <a:ext uri="{FF2B5EF4-FFF2-40B4-BE49-F238E27FC236}">
+                <a16:creationId xmlns:a16="http://schemas.microsoft.com/office/drawing/2014/main" id="{AB176911-89C4-534B-BFF3-B005F5BC1244}"/>
+              </a:ext>
+            </a:extLst>
+          </p:cNvPr>
+          <p:cNvPicPr>
+            <a:picLocks noChangeAspect="1"/>
+          </p:cNvPicPr>
+          <p:nvPr/>
+        </p:nvPicPr>
+        <p:blipFill>
+          <a:blip r:embed="rId6"/>
+          <a:stretch>
+            <a:fillRect/>
+          </a:stretch>
+        </p:blipFill>
+        <p:spPr>
+          <a:xfrm>
+            <a:off x="3033" y="4664273"/>
+            <a:ext cx="5829642" cy="1611724"/>
+          </a:xfrm>
+          <a:prstGeom prst="rect">
+            <a:avLst/>
+          </a:prstGeom>
+        </p:spPr>
+      </p:pic>
+      <p:pic>
+        <p:nvPicPr>
+          <p:cNvPr id="13" name="Picture 12">
+            <a:extLst>
+              <a:ext uri="{FF2B5EF4-FFF2-40B4-BE49-F238E27FC236}">
+                <a16:creationId xmlns:a16="http://schemas.microsoft.com/office/drawing/2014/main" id="{03481217-539F-264F-8722-EC3B77719301}"/>
+              </a:ext>
+            </a:extLst>
+          </p:cNvPr>
+          <p:cNvPicPr>
+            <a:picLocks noChangeAspect="1"/>
+          </p:cNvPicPr>
+          <p:nvPr/>
+        </p:nvPicPr>
+        <p:blipFill>
+          <a:blip r:embed="rId7"/>
+          <a:stretch>
+            <a:fillRect/>
+          </a:stretch>
+        </p:blipFill>
+        <p:spPr>
+          <a:xfrm>
+            <a:off x="0" y="2429643"/>
+            <a:ext cx="5848221" cy="1616861"/>
+          </a:xfrm>
+          <a:prstGeom prst="rect">
+            <a:avLst/>
+          </a:prstGeom>
+        </p:spPr>
+      </p:pic>
+      <p:sp>
+        <p:nvSpPr>
+          <p:cNvPr id="14" name="TextBox 13">
+            <a:extLst>
+              <a:ext uri="{FF2B5EF4-FFF2-40B4-BE49-F238E27FC236}">
+                <a16:creationId xmlns:a16="http://schemas.microsoft.com/office/drawing/2014/main" id="{22B09280-3B17-7342-93EC-7251BE395786}"/>
               </a:ext>
             </a:extLst>
           </p:cNvPr>
@@ -4489,8 +4880,8 @@
         </p:nvSpPr>
         <p:spPr>
           <a:xfrm>
-            <a:off x="8310081" y="6325738"/>
-            <a:ext cx="1695977" cy="369332"/>
+            <a:off x="1919555" y="4247256"/>
+            <a:ext cx="2693045" cy="369332"/>
           </a:xfrm>
           <a:prstGeom prst="rect">
             <a:avLst/>
@@ -4505,7 +4896,42 @@
           <a:p>
             <a:r>
               <a:rPr lang="en-US" dirty="0"/>
-              <a:t>S15 T2 33 genes</a:t>
+              <a:t>S15 T1 enriched 189 genes</a:t>
+            </a:r>
+          </a:p>
+        </p:txBody>
+      </p:sp>
+      <p:sp>
+        <p:nvSpPr>
+          <p:cNvPr id="15" name="TextBox 14">
+            <a:extLst>
+              <a:ext uri="{FF2B5EF4-FFF2-40B4-BE49-F238E27FC236}">
+                <a16:creationId xmlns:a16="http://schemas.microsoft.com/office/drawing/2014/main" id="{5DFBF5A8-D33E-014B-AA67-E96FA3683664}"/>
+              </a:ext>
+            </a:extLst>
+          </p:cNvPr>
+          <p:cNvSpPr txBox="1"/>
+          <p:nvPr/>
+        </p:nvSpPr>
+        <p:spPr>
+          <a:xfrm>
+            <a:off x="1919555" y="6560530"/>
+            <a:ext cx="2576026" cy="369332"/>
+          </a:xfrm>
+          <a:prstGeom prst="rect">
+            <a:avLst/>
+          </a:prstGeom>
+          <a:noFill/>
+        </p:spPr>
+        <p:txBody>
+          <a:bodyPr wrap="none" rtlCol="0">
+            <a:spAutoFit/>
+          </a:bodyPr>
+          <a:lstStyle/>
+          <a:p>
+            <a:r>
+              <a:rPr lang="en-US" dirty="0"/>
+              <a:t>S15 T2 enriched 33 genes</a:t>
             </a:r>
           </a:p>
         </p:txBody>
@@ -4513,7 +4939,7 @@
     </p:spTree>
     <p:extLst>
       <p:ext uri="{BB962C8B-B14F-4D97-AF65-F5344CB8AC3E}">
-        <p14:creationId xmlns:p14="http://schemas.microsoft.com/office/powerpoint/2010/main" val="3120621623"/>
+        <p14:creationId xmlns:p14="http://schemas.microsoft.com/office/powerpoint/2010/main" val="2140785614"/>
       </p:ext>
     </p:extLst>
   </p:cSld>

</xml_diff>